<commit_message>
feat(v0.2.3): Multiple condition example
Multiple condition example added to ipynb example and pptx completed
</commit_message>
<xml_diff>
--- a/references/03_DataFrame.pptx
+++ b/references/03_DataFrame.pptx
@@ -5,7 +5,7 @@
     <p:sldMasterId id="2147483661" r:id="rId1"/>
   </p:sldMasterIdLst>
   <p:notesMasterIdLst>
-    <p:notesMasterId r:id="rId8"/>
+    <p:notesMasterId r:id="rId15"/>
   </p:notesMasterIdLst>
   <p:sldIdLst>
     <p:sldId id="2141411446" r:id="rId2"/>
@@ -13,7 +13,14 @@
     <p:sldId id="2141411451" r:id="rId4"/>
     <p:sldId id="2141411448" r:id="rId5"/>
     <p:sldId id="3044" r:id="rId6"/>
-    <p:sldId id="2141411449" r:id="rId7"/>
+    <p:sldId id="2141411453" r:id="rId7"/>
+    <p:sldId id="2141411449" r:id="rId8"/>
+    <p:sldId id="2141411452" r:id="rId9"/>
+    <p:sldId id="2141411454" r:id="rId10"/>
+    <p:sldId id="2141411455" r:id="rId11"/>
+    <p:sldId id="2141411457" r:id="rId12"/>
+    <p:sldId id="2141411458" r:id="rId13"/>
+    <p:sldId id="2141411456" r:id="rId14"/>
   </p:sldIdLst>
   <p:sldSz cx="12192000" cy="6858000"/>
   <p:notesSz cx="6858000" cy="9144000"/>
@@ -202,7 +209,7 @@
           <a:p>
             <a:fld id="{299CAFE8-42F5-4056-865F-8BF4CB53BBFA}" type="datetimeFigureOut">
               <a:rPr lang="en-GB" smtClean="0"/>
-              <a:t>11/05/2023</a:t>
+              <a:t>15/06/2023</a:t>
             </a:fld>
             <a:endParaRPr lang="en-GB"/>
           </a:p>
@@ -907,7 +914,7 @@
           <a:p>
             <a:fld id="{D3E068FC-FE45-45C4-9E03-B2F436A483E6}" type="datetimeFigureOut">
               <a:rPr lang="en-GB" smtClean="0"/>
-              <a:t>11/05/2023</a:t>
+              <a:t>15/06/2023</a:t>
             </a:fld>
             <a:endParaRPr lang="en-GB"/>
           </a:p>
@@ -1077,7 +1084,7 @@
           <a:p>
             <a:fld id="{D3E068FC-FE45-45C4-9E03-B2F436A483E6}" type="datetimeFigureOut">
               <a:rPr lang="en-GB" smtClean="0"/>
-              <a:t>11/05/2023</a:t>
+              <a:t>15/06/2023</a:t>
             </a:fld>
             <a:endParaRPr lang="en-GB"/>
           </a:p>
@@ -1257,7 +1264,7 @@
           <a:p>
             <a:fld id="{D3E068FC-FE45-45C4-9E03-B2F436A483E6}" type="datetimeFigureOut">
               <a:rPr lang="en-GB" smtClean="0"/>
-              <a:t>11/05/2023</a:t>
+              <a:t>15/06/2023</a:t>
             </a:fld>
             <a:endParaRPr lang="en-GB"/>
           </a:p>
@@ -2756,7 +2763,7 @@
           <a:p>
             <a:fld id="{D3E068FC-FE45-45C4-9E03-B2F436A483E6}" type="datetimeFigureOut">
               <a:rPr lang="en-GB" smtClean="0"/>
-              <a:t>11/05/2023</a:t>
+              <a:t>15/06/2023</a:t>
             </a:fld>
             <a:endParaRPr lang="en-GB"/>
           </a:p>
@@ -3002,7 +3009,7 @@
           <a:p>
             <a:fld id="{D3E068FC-FE45-45C4-9E03-B2F436A483E6}" type="datetimeFigureOut">
               <a:rPr lang="en-GB" smtClean="0"/>
-              <a:t>11/05/2023</a:t>
+              <a:t>15/06/2023</a:t>
             </a:fld>
             <a:endParaRPr lang="en-GB"/>
           </a:p>
@@ -3234,7 +3241,7 @@
           <a:p>
             <a:fld id="{D3E068FC-FE45-45C4-9E03-B2F436A483E6}" type="datetimeFigureOut">
               <a:rPr lang="en-GB" smtClean="0"/>
-              <a:t>11/05/2023</a:t>
+              <a:t>15/06/2023</a:t>
             </a:fld>
             <a:endParaRPr lang="en-GB"/>
           </a:p>
@@ -3601,7 +3608,7 @@
           <a:p>
             <a:fld id="{D3E068FC-FE45-45C4-9E03-B2F436A483E6}" type="datetimeFigureOut">
               <a:rPr lang="en-GB" smtClean="0"/>
-              <a:t>11/05/2023</a:t>
+              <a:t>15/06/2023</a:t>
             </a:fld>
             <a:endParaRPr lang="en-GB"/>
           </a:p>
@@ -3719,7 +3726,7 @@
           <a:p>
             <a:fld id="{D3E068FC-FE45-45C4-9E03-B2F436A483E6}" type="datetimeFigureOut">
               <a:rPr lang="en-GB" smtClean="0"/>
-              <a:t>11/05/2023</a:t>
+              <a:t>15/06/2023</a:t>
             </a:fld>
             <a:endParaRPr lang="en-GB"/>
           </a:p>
@@ -3814,7 +3821,7 @@
           <a:p>
             <a:fld id="{D3E068FC-FE45-45C4-9E03-B2F436A483E6}" type="datetimeFigureOut">
               <a:rPr lang="en-GB" smtClean="0"/>
-              <a:t>11/05/2023</a:t>
+              <a:t>15/06/2023</a:t>
             </a:fld>
             <a:endParaRPr lang="en-GB"/>
           </a:p>
@@ -4091,7 +4098,7 @@
           <a:p>
             <a:fld id="{D3E068FC-FE45-45C4-9E03-B2F436A483E6}" type="datetimeFigureOut">
               <a:rPr lang="en-GB" smtClean="0"/>
-              <a:t>11/05/2023</a:t>
+              <a:t>15/06/2023</a:t>
             </a:fld>
             <a:endParaRPr lang="en-GB"/>
           </a:p>
@@ -4348,7 +4355,7 @@
           <a:p>
             <a:fld id="{D3E068FC-FE45-45C4-9E03-B2F436A483E6}" type="datetimeFigureOut">
               <a:rPr lang="en-GB" smtClean="0"/>
-              <a:t>11/05/2023</a:t>
+              <a:t>15/06/2023</a:t>
             </a:fld>
             <a:endParaRPr lang="en-GB"/>
           </a:p>
@@ -4561,7 +4568,7 @@
           <a:p>
             <a:fld id="{D3E068FC-FE45-45C4-9E03-B2F436A483E6}" type="datetimeFigureOut">
               <a:rPr lang="en-GB" smtClean="0"/>
-              <a:t>11/05/2023</a:t>
+              <a:t>15/06/2023</a:t>
             </a:fld>
             <a:endParaRPr lang="en-GB"/>
           </a:p>
@@ -5130,7 +5137,7 @@
             </a:pPr>
             <a:r>
               <a:rPr lang="en-US" sz="2000" spc="400" dirty="0"/>
-              <a:t>02_Orders and Iterations</a:t>
+              <a:t>03_DataFrame</a:t>
             </a:r>
           </a:p>
         </p:txBody>
@@ -5234,6 +5241,780 @@
     <p:extLst>
       <p:ext uri="{BB962C8B-B14F-4D97-AF65-F5344CB8AC3E}">
         <p14:creationId xmlns:p14="http://schemas.microsoft.com/office/powerpoint/2010/main" val="875687142"/>
+      </p:ext>
+    </p:extLst>
+  </p:cSld>
+  <p:clrMapOvr>
+    <a:masterClrMapping/>
+  </p:clrMapOvr>
+</p:sld>
+</file>
+
+<file path=ppt/slides/slide10.xml><?xml version="1.0" encoding="utf-8"?>
+<p:sld xmlns:a="http://schemas.openxmlformats.org/drawingml/2006/main" xmlns:r="http://schemas.openxmlformats.org/officeDocument/2006/relationships" xmlns:p="http://schemas.openxmlformats.org/presentationml/2006/main">
+  <p:cSld>
+    <p:spTree>
+      <p:nvGrpSpPr>
+        <p:cNvPr id="1" name=""/>
+        <p:cNvGrpSpPr/>
+        <p:nvPr/>
+      </p:nvGrpSpPr>
+      <p:grpSpPr>
+        <a:xfrm>
+          <a:off x="0" y="0"/>
+          <a:ext cx="0" cy="0"/>
+          <a:chOff x="0" y="0"/>
+          <a:chExt cx="0" cy="0"/>
+        </a:xfrm>
+      </p:grpSpPr>
+      <p:sp>
+        <p:nvSpPr>
+          <p:cNvPr id="2" name="Title 1">
+            <a:extLst>
+              <a:ext uri="{FF2B5EF4-FFF2-40B4-BE49-F238E27FC236}">
+                <a16:creationId xmlns:a16="http://schemas.microsoft.com/office/drawing/2014/main" id="{D4D57C10-3395-E944-AC5D-466668F8A049}"/>
+              </a:ext>
+            </a:extLst>
+          </p:cNvPr>
+          <p:cNvSpPr>
+            <a:spLocks noGrp="1"/>
+          </p:cNvSpPr>
+          <p:nvPr>
+            <p:ph type="title"/>
+          </p:nvPr>
+        </p:nvSpPr>
+        <p:spPr/>
+        <p:txBody>
+          <a:bodyPr>
+            <a:normAutofit fontScale="90000"/>
+          </a:bodyPr>
+          <a:lstStyle/>
+          <a:p>
+            <a:r>
+              <a:rPr lang="en-US" dirty="0"/>
+              <a:t>Join and Merges</a:t>
+            </a:r>
+          </a:p>
+        </p:txBody>
+      </p:sp>
+      <p:pic>
+        <p:nvPicPr>
+          <p:cNvPr id="13" name="Content Placeholder 12" descr="A collage of a person with different facial expressions&#10;&#10;Description automatically generated with medium confidence">
+            <a:extLst>
+              <a:ext uri="{FF2B5EF4-FFF2-40B4-BE49-F238E27FC236}">
+                <a16:creationId xmlns:a16="http://schemas.microsoft.com/office/drawing/2014/main" id="{EBE94497-3431-4115-9A80-F8C5FD1B104F}"/>
+              </a:ext>
+            </a:extLst>
+          </p:cNvPr>
+          <p:cNvPicPr>
+            <a:picLocks noGrp="1" noChangeAspect="1"/>
+          </p:cNvPicPr>
+          <p:nvPr>
+            <p:ph idx="10"/>
+          </p:nvPr>
+        </p:nvPicPr>
+        <p:blipFill>
+          <a:blip r:embed="rId2">
+            <a:extLst>
+              <a:ext uri="{28A0092B-C50C-407E-A947-70E740481C1C}">
+                <a14:useLocalDpi xmlns:a14="http://schemas.microsoft.com/office/drawing/2010/main" val="0"/>
+              </a:ext>
+            </a:extLst>
+          </a:blip>
+          <a:stretch>
+            <a:fillRect/>
+          </a:stretch>
+        </p:blipFill>
+        <p:spPr>
+          <a:xfrm>
+            <a:off x="7417875" y="1075300"/>
+            <a:ext cx="3566749" cy="4872196"/>
+          </a:xfrm>
+        </p:spPr>
+      </p:pic>
+      <p:pic>
+        <p:nvPicPr>
+          <p:cNvPr id="11" name="Content Placeholder 10" descr="A screenshot of a computer&#10;&#10;Description automatically generated with low confidence">
+            <a:extLst>
+              <a:ext uri="{FF2B5EF4-FFF2-40B4-BE49-F238E27FC236}">
+                <a16:creationId xmlns:a16="http://schemas.microsoft.com/office/drawing/2014/main" id="{40FAB8B7-5E62-4197-8AD8-464C1AAA7078}"/>
+              </a:ext>
+            </a:extLst>
+          </p:cNvPr>
+          <p:cNvPicPr>
+            <a:picLocks noGrp="1" noChangeAspect="1"/>
+          </p:cNvPicPr>
+          <p:nvPr>
+            <p:ph idx="1"/>
+          </p:nvPr>
+        </p:nvPicPr>
+        <p:blipFill>
+          <a:blip r:embed="rId3">
+            <a:extLst>
+              <a:ext uri="{28A0092B-C50C-407E-A947-70E740481C1C}">
+                <a14:useLocalDpi xmlns:a14="http://schemas.microsoft.com/office/drawing/2010/main" val="0"/>
+              </a:ext>
+            </a:extLst>
+          </a:blip>
+          <a:stretch>
+            <a:fillRect/>
+          </a:stretch>
+        </p:blipFill>
+        <p:spPr>
+          <a:xfrm>
+            <a:off x="1028262" y="1597102"/>
+            <a:ext cx="4576018" cy="4351337"/>
+          </a:xfrm>
+        </p:spPr>
+      </p:pic>
+    </p:spTree>
+    <p:extLst>
+      <p:ext uri="{BB962C8B-B14F-4D97-AF65-F5344CB8AC3E}">
+        <p14:creationId xmlns:p14="http://schemas.microsoft.com/office/powerpoint/2010/main" val="3061874217"/>
+      </p:ext>
+    </p:extLst>
+  </p:cSld>
+  <p:clrMapOvr>
+    <a:masterClrMapping/>
+  </p:clrMapOvr>
+</p:sld>
+</file>
+
+<file path=ppt/slides/slide11.xml><?xml version="1.0" encoding="utf-8"?>
+<p:sld xmlns:a="http://schemas.openxmlformats.org/drawingml/2006/main" xmlns:r="http://schemas.openxmlformats.org/officeDocument/2006/relationships" xmlns:p="http://schemas.openxmlformats.org/presentationml/2006/main">
+  <p:cSld>
+    <p:spTree>
+      <p:nvGrpSpPr>
+        <p:cNvPr id="1" name=""/>
+        <p:cNvGrpSpPr/>
+        <p:nvPr/>
+      </p:nvGrpSpPr>
+      <p:grpSpPr>
+        <a:xfrm>
+          <a:off x="0" y="0"/>
+          <a:ext cx="0" cy="0"/>
+          <a:chOff x="0" y="0"/>
+          <a:chExt cx="0" cy="0"/>
+        </a:xfrm>
+      </p:grpSpPr>
+      <p:sp>
+        <p:nvSpPr>
+          <p:cNvPr id="6" name="Content Placeholder 5">
+            <a:extLst>
+              <a:ext uri="{FF2B5EF4-FFF2-40B4-BE49-F238E27FC236}">
+                <a16:creationId xmlns:a16="http://schemas.microsoft.com/office/drawing/2014/main" id="{D66876B6-6B89-5842-800F-D3EAFA21F9A4}"/>
+              </a:ext>
+            </a:extLst>
+          </p:cNvPr>
+          <p:cNvSpPr>
+            <a:spLocks noGrp="1"/>
+          </p:cNvSpPr>
+          <p:nvPr>
+            <p:ph idx="1"/>
+          </p:nvPr>
+        </p:nvSpPr>
+        <p:spPr>
+          <a:xfrm>
+            <a:off x="756159" y="1674307"/>
+            <a:ext cx="5339841" cy="4351338"/>
+          </a:xfrm>
+        </p:spPr>
+        <p:txBody>
+          <a:bodyPr>
+            <a:normAutofit/>
+          </a:bodyPr>
+          <a:lstStyle/>
+          <a:p>
+            <a:pPr lvl="1"/>
+            <a:r>
+              <a:rPr lang="en-US" dirty="0">
+                <a:solidFill>
+                  <a:schemeClr val="tx1"/>
+                </a:solidFill>
+              </a:rPr>
+              <a:t>How can we parse qualitative data?</a:t>
+            </a:r>
+          </a:p>
+          <a:p>
+            <a:pPr marL="457200" lvl="1" indent="0">
+              <a:buNone/>
+            </a:pPr>
+            <a:r>
+              <a:rPr lang="en-US" dirty="0">
+                <a:solidFill>
+                  <a:schemeClr val="tx1"/>
+                </a:solidFill>
+              </a:rPr>
+              <a:t> </a:t>
+            </a:r>
+          </a:p>
+          <a:p>
+            <a:pPr lvl="1"/>
+            <a:r>
+              <a:rPr lang="en-US" dirty="0">
+                <a:solidFill>
+                  <a:schemeClr val="tx1"/>
+                </a:solidFill>
+              </a:rPr>
+              <a:t>Regular expression is used everywhere but little known</a:t>
+            </a:r>
+          </a:p>
+          <a:p>
+            <a:pPr marL="457200" lvl="1" indent="0">
+              <a:buNone/>
+            </a:pPr>
+            <a:r>
+              <a:rPr lang="en-US" dirty="0">
+                <a:solidFill>
+                  <a:schemeClr val="tx1"/>
+                </a:solidFill>
+              </a:rPr>
+              <a:t> </a:t>
+            </a:r>
+          </a:p>
+          <a:p>
+            <a:pPr lvl="1"/>
+            <a:r>
+              <a:rPr lang="en-US" dirty="0">
+                <a:solidFill>
+                  <a:schemeClr val="tx1"/>
+                </a:solidFill>
+              </a:rPr>
+              <a:t>System of pattern match invented by mathematician in the 1950s</a:t>
+            </a:r>
+          </a:p>
+          <a:p>
+            <a:pPr lvl="1"/>
+            <a:endParaRPr lang="en-US" dirty="0">
+              <a:solidFill>
+                <a:schemeClr val="tx1"/>
+              </a:solidFill>
+            </a:endParaRPr>
+          </a:p>
+          <a:p>
+            <a:pPr lvl="1"/>
+            <a:r>
+              <a:rPr lang="en-US" dirty="0">
+                <a:solidFill>
+                  <a:schemeClr val="tx1"/>
+                </a:solidFill>
+              </a:rPr>
+              <a:t>Once mastered, it’s a superpower</a:t>
+            </a:r>
+          </a:p>
+        </p:txBody>
+      </p:sp>
+      <p:sp>
+        <p:nvSpPr>
+          <p:cNvPr id="5" name="Title 4">
+            <a:extLst>
+              <a:ext uri="{FF2B5EF4-FFF2-40B4-BE49-F238E27FC236}">
+                <a16:creationId xmlns:a16="http://schemas.microsoft.com/office/drawing/2014/main" id="{7A11AE77-9C73-504A-BCBC-2A80957C415B}"/>
+              </a:ext>
+            </a:extLst>
+          </p:cNvPr>
+          <p:cNvSpPr>
+            <a:spLocks noGrp="1"/>
+          </p:cNvSpPr>
+          <p:nvPr>
+            <p:ph type="title"/>
+          </p:nvPr>
+        </p:nvSpPr>
+        <p:spPr/>
+        <p:txBody>
+          <a:bodyPr/>
+          <a:lstStyle/>
+          <a:p>
+            <a:r>
+              <a:rPr lang="en-US" dirty="0"/>
+              <a:t>Regular Expressions (Regex)</a:t>
+            </a:r>
+          </a:p>
+        </p:txBody>
+      </p:sp>
+      <p:pic>
+        <p:nvPicPr>
+          <p:cNvPr id="4" name="Content Placeholder 3" descr="A picture containing text, cartoon, clipart, handwriting&#10;&#10;Description automatically generated">
+            <a:extLst>
+              <a:ext uri="{FF2B5EF4-FFF2-40B4-BE49-F238E27FC236}">
+                <a16:creationId xmlns:a16="http://schemas.microsoft.com/office/drawing/2014/main" id="{4A8B49D5-1226-4C2D-AD45-76CEA98787C0}"/>
+              </a:ext>
+            </a:extLst>
+          </p:cNvPr>
+          <p:cNvPicPr>
+            <a:picLocks noGrp="1" noChangeAspect="1"/>
+          </p:cNvPicPr>
+          <p:nvPr>
+            <p:ph idx="10"/>
+          </p:nvPr>
+        </p:nvPicPr>
+        <p:blipFill>
+          <a:blip r:embed="rId2">
+            <a:extLst>
+              <a:ext uri="{28A0092B-C50C-407E-A947-70E740481C1C}">
+                <a14:useLocalDpi xmlns:a14="http://schemas.microsoft.com/office/drawing/2010/main" val="0"/>
+              </a:ext>
+            </a:extLst>
+          </a:blip>
+          <a:stretch>
+            <a:fillRect/>
+          </a:stretch>
+        </p:blipFill>
+        <p:spPr>
+          <a:xfrm>
+            <a:off x="6502954" y="1256840"/>
+            <a:ext cx="4768805" cy="4768805"/>
+          </a:xfrm>
+        </p:spPr>
+      </p:pic>
+    </p:spTree>
+    <p:extLst>
+      <p:ext uri="{BB962C8B-B14F-4D97-AF65-F5344CB8AC3E}">
+        <p14:creationId xmlns:p14="http://schemas.microsoft.com/office/powerpoint/2010/main" val="2854638243"/>
+      </p:ext>
+    </p:extLst>
+  </p:cSld>
+  <p:clrMapOvr>
+    <a:masterClrMapping/>
+  </p:clrMapOvr>
+</p:sld>
+</file>
+
+<file path=ppt/slides/slide12.xml><?xml version="1.0" encoding="utf-8"?>
+<p:sld xmlns:a="http://schemas.openxmlformats.org/drawingml/2006/main" xmlns:r="http://schemas.openxmlformats.org/officeDocument/2006/relationships" xmlns:p="http://schemas.openxmlformats.org/presentationml/2006/main">
+  <p:cSld>
+    <p:spTree>
+      <p:nvGrpSpPr>
+        <p:cNvPr id="1" name=""/>
+        <p:cNvGrpSpPr/>
+        <p:nvPr/>
+      </p:nvGrpSpPr>
+      <p:grpSpPr>
+        <a:xfrm>
+          <a:off x="0" y="0"/>
+          <a:ext cx="0" cy="0"/>
+          <a:chOff x="0" y="0"/>
+          <a:chExt cx="0" cy="0"/>
+        </a:xfrm>
+      </p:grpSpPr>
+      <p:sp>
+        <p:nvSpPr>
+          <p:cNvPr id="6" name="Content Placeholder 5">
+            <a:extLst>
+              <a:ext uri="{FF2B5EF4-FFF2-40B4-BE49-F238E27FC236}">
+                <a16:creationId xmlns:a16="http://schemas.microsoft.com/office/drawing/2014/main" id="{D66876B6-6B89-5842-800F-D3EAFA21F9A4}"/>
+              </a:ext>
+            </a:extLst>
+          </p:cNvPr>
+          <p:cNvSpPr>
+            <a:spLocks noGrp="1"/>
+          </p:cNvSpPr>
+          <p:nvPr>
+            <p:ph idx="1"/>
+          </p:nvPr>
+        </p:nvSpPr>
+        <p:spPr>
+          <a:xfrm>
+            <a:off x="756159" y="1674307"/>
+            <a:ext cx="10547567" cy="4351338"/>
+          </a:xfrm>
+        </p:spPr>
+        <p:txBody>
+          <a:bodyPr>
+            <a:normAutofit/>
+          </a:bodyPr>
+          <a:lstStyle/>
+          <a:p>
+            <a:pPr marL="457200" lvl="1" indent="0">
+              <a:buNone/>
+            </a:pPr>
+            <a:endParaRPr lang="en-US" dirty="0">
+              <a:solidFill>
+                <a:schemeClr val="tx1"/>
+              </a:solidFill>
+            </a:endParaRPr>
+          </a:p>
+        </p:txBody>
+      </p:sp>
+      <p:sp>
+        <p:nvSpPr>
+          <p:cNvPr id="5" name="Title 4">
+            <a:extLst>
+              <a:ext uri="{FF2B5EF4-FFF2-40B4-BE49-F238E27FC236}">
+                <a16:creationId xmlns:a16="http://schemas.microsoft.com/office/drawing/2014/main" id="{7A11AE77-9C73-504A-BCBC-2A80957C415B}"/>
+              </a:ext>
+            </a:extLst>
+          </p:cNvPr>
+          <p:cNvSpPr>
+            <a:spLocks noGrp="1"/>
+          </p:cNvSpPr>
+          <p:nvPr>
+            <p:ph type="title"/>
+          </p:nvPr>
+        </p:nvSpPr>
+        <p:spPr/>
+        <p:txBody>
+          <a:bodyPr/>
+          <a:lstStyle/>
+          <a:p>
+            <a:r>
+              <a:rPr lang="en-US" dirty="0"/>
+              <a:t>Regex </a:t>
+            </a:r>
+            <a:r>
+              <a:rPr lang="en-US" dirty="0" err="1"/>
+              <a:t>cheatsheet</a:t>
+            </a:r>
+            <a:endParaRPr lang="en-US" dirty="0"/>
+          </a:p>
+        </p:txBody>
+      </p:sp>
+      <p:sp>
+        <p:nvSpPr>
+          <p:cNvPr id="3" name="Content Placeholder 2">
+            <a:extLst>
+              <a:ext uri="{FF2B5EF4-FFF2-40B4-BE49-F238E27FC236}">
+                <a16:creationId xmlns:a16="http://schemas.microsoft.com/office/drawing/2014/main" id="{9E972EF1-4067-4C78-98F7-B2A89688E484}"/>
+              </a:ext>
+            </a:extLst>
+          </p:cNvPr>
+          <p:cNvSpPr>
+            <a:spLocks noGrp="1"/>
+          </p:cNvSpPr>
+          <p:nvPr>
+            <p:ph idx="10"/>
+          </p:nvPr>
+        </p:nvSpPr>
+        <p:spPr/>
+        <p:txBody>
+          <a:bodyPr/>
+          <a:lstStyle/>
+          <a:p>
+            <a:r>
+              <a:rPr lang="en-US" dirty="0">
+                <a:solidFill>
+                  <a:schemeClr val="tx1"/>
+                </a:solidFill>
+                <a:hlinkClick r:id="rId2"/>
+              </a:rPr>
+              <a:t>https://rstudio.github.io/cheatsheets/html/strings.html</a:t>
+            </a:r>
+            <a:r>
+              <a:rPr lang="en-US" dirty="0">
+                <a:solidFill>
+                  <a:schemeClr val="tx1"/>
+                </a:solidFill>
+              </a:rPr>
+              <a:t>  </a:t>
+            </a:r>
+          </a:p>
+          <a:p>
+            <a:endParaRPr lang="en-GB" dirty="0"/>
+          </a:p>
+        </p:txBody>
+      </p:sp>
+      <p:pic>
+        <p:nvPicPr>
+          <p:cNvPr id="8" name="Picture 7">
+            <a:extLst>
+              <a:ext uri="{FF2B5EF4-FFF2-40B4-BE49-F238E27FC236}">
+                <a16:creationId xmlns:a16="http://schemas.microsoft.com/office/drawing/2014/main" id="{780BD842-BB61-41C1-8A07-4478D87C86E4}"/>
+              </a:ext>
+            </a:extLst>
+          </p:cNvPr>
+          <p:cNvPicPr>
+            <a:picLocks noChangeAspect="1"/>
+          </p:cNvPicPr>
+          <p:nvPr/>
+        </p:nvPicPr>
+        <p:blipFill>
+          <a:blip r:embed="rId3"/>
+          <a:stretch>
+            <a:fillRect/>
+          </a:stretch>
+        </p:blipFill>
+        <p:spPr>
+          <a:xfrm>
+            <a:off x="2367244" y="1159453"/>
+            <a:ext cx="7325396" cy="5662798"/>
+          </a:xfrm>
+          <a:prstGeom prst="rect">
+            <a:avLst/>
+          </a:prstGeom>
+        </p:spPr>
+      </p:pic>
+    </p:spTree>
+    <p:extLst>
+      <p:ext uri="{BB962C8B-B14F-4D97-AF65-F5344CB8AC3E}">
+        <p14:creationId xmlns:p14="http://schemas.microsoft.com/office/powerpoint/2010/main" val="1193360987"/>
+      </p:ext>
+    </p:extLst>
+  </p:cSld>
+  <p:clrMapOvr>
+    <a:masterClrMapping/>
+  </p:clrMapOvr>
+</p:sld>
+</file>
+
+<file path=ppt/slides/slide13.xml><?xml version="1.0" encoding="utf-8"?>
+<p:sld xmlns:a="http://schemas.openxmlformats.org/drawingml/2006/main" xmlns:r="http://schemas.openxmlformats.org/officeDocument/2006/relationships" xmlns:p="http://schemas.openxmlformats.org/presentationml/2006/main">
+  <p:cSld>
+    <p:spTree>
+      <p:nvGrpSpPr>
+        <p:cNvPr id="1" name=""/>
+        <p:cNvGrpSpPr/>
+        <p:nvPr/>
+      </p:nvGrpSpPr>
+      <p:grpSpPr>
+        <a:xfrm>
+          <a:off x="0" y="0"/>
+          <a:ext cx="0" cy="0"/>
+          <a:chOff x="0" y="0"/>
+          <a:chExt cx="0" cy="0"/>
+        </a:xfrm>
+      </p:grpSpPr>
+      <p:sp>
+        <p:nvSpPr>
+          <p:cNvPr id="2" name="Title 1">
+            <a:extLst>
+              <a:ext uri="{FF2B5EF4-FFF2-40B4-BE49-F238E27FC236}">
+                <a16:creationId xmlns:a16="http://schemas.microsoft.com/office/drawing/2014/main" id="{D4D57C10-3395-E944-AC5D-466668F8A049}"/>
+              </a:ext>
+            </a:extLst>
+          </p:cNvPr>
+          <p:cNvSpPr>
+            <a:spLocks noGrp="1"/>
+          </p:cNvSpPr>
+          <p:nvPr>
+            <p:ph type="title"/>
+          </p:nvPr>
+        </p:nvSpPr>
+        <p:spPr/>
+        <p:txBody>
+          <a:bodyPr>
+            <a:normAutofit fontScale="90000"/>
+          </a:bodyPr>
+          <a:lstStyle/>
+          <a:p>
+            <a:r>
+              <a:rPr lang="en-US" dirty="0"/>
+              <a:t>Operations to explore</a:t>
+            </a:r>
+          </a:p>
+        </p:txBody>
+      </p:sp>
+      <p:sp>
+        <p:nvSpPr>
+          <p:cNvPr id="3" name="Content Placeholder 2">
+            <a:extLst>
+              <a:ext uri="{FF2B5EF4-FFF2-40B4-BE49-F238E27FC236}">
+                <a16:creationId xmlns:a16="http://schemas.microsoft.com/office/drawing/2014/main" id="{9710D64A-7D47-3F45-8BC8-069C5288702D}"/>
+              </a:ext>
+            </a:extLst>
+          </p:cNvPr>
+          <p:cNvSpPr>
+            <a:spLocks noGrp="1"/>
+          </p:cNvSpPr>
+          <p:nvPr>
+            <p:ph idx="1"/>
+          </p:nvPr>
+        </p:nvSpPr>
+        <p:spPr>
+          <a:xfrm>
+            <a:off x="6096000" y="1704831"/>
+            <a:ext cx="5099518" cy="4351338"/>
+          </a:xfrm>
+        </p:spPr>
+        <p:txBody>
+          <a:bodyPr>
+            <a:normAutofit lnSpcReduction="10000"/>
+          </a:bodyPr>
+          <a:lstStyle/>
+          <a:p>
+            <a:r>
+              <a:rPr lang="en-US" sz="2000" dirty="0">
+                <a:solidFill>
+                  <a:schemeClr val="tx1"/>
+                </a:solidFill>
+              </a:rPr>
+              <a:t>Pivoting</a:t>
+            </a:r>
+          </a:p>
+          <a:p>
+            <a:pPr marL="0" indent="0">
+              <a:buNone/>
+            </a:pPr>
+            <a:r>
+              <a:rPr lang="en-US" sz="2000" dirty="0">
+                <a:solidFill>
+                  <a:schemeClr val="tx1"/>
+                </a:solidFill>
+              </a:rPr>
+              <a:t> </a:t>
+            </a:r>
+          </a:p>
+          <a:p>
+            <a:r>
+              <a:rPr lang="en-US" sz="2000" dirty="0">
+                <a:solidFill>
+                  <a:schemeClr val="tx1"/>
+                </a:solidFill>
+              </a:rPr>
+              <a:t>Regex pattern match</a:t>
+            </a:r>
+          </a:p>
+          <a:p>
+            <a:pPr marL="0" indent="0">
+              <a:buNone/>
+            </a:pPr>
+            <a:r>
+              <a:rPr lang="en-US" sz="2000" dirty="0">
+                <a:solidFill>
+                  <a:schemeClr val="tx1"/>
+                </a:solidFill>
+              </a:rPr>
+              <a:t> </a:t>
+            </a:r>
+          </a:p>
+          <a:p>
+            <a:r>
+              <a:rPr lang="en-US" sz="2000" dirty="0" err="1">
+                <a:solidFill>
+                  <a:schemeClr val="tx1"/>
+                </a:solidFill>
+              </a:rPr>
+              <a:t>Subsetting</a:t>
+            </a:r>
+            <a:r>
+              <a:rPr lang="en-US" sz="2000" dirty="0">
+                <a:solidFill>
+                  <a:schemeClr val="tx1"/>
+                </a:solidFill>
+              </a:rPr>
+              <a:t> my datetime objects</a:t>
+            </a:r>
+          </a:p>
+          <a:p>
+            <a:endParaRPr lang="en-US" sz="2000" dirty="0">
+              <a:solidFill>
+                <a:schemeClr val="tx1"/>
+              </a:solidFill>
+            </a:endParaRPr>
+          </a:p>
+          <a:p>
+            <a:r>
+              <a:rPr lang="en-US" sz="2000" dirty="0">
+                <a:solidFill>
+                  <a:schemeClr val="tx1"/>
+                </a:solidFill>
+              </a:rPr>
+              <a:t> Datetime comparison</a:t>
+            </a:r>
+          </a:p>
+          <a:p>
+            <a:endParaRPr lang="en-US" sz="2000" dirty="0">
+              <a:solidFill>
+                <a:schemeClr val="tx1"/>
+              </a:solidFill>
+            </a:endParaRPr>
+          </a:p>
+          <a:p>
+            <a:r>
+              <a:rPr lang="en-US" sz="2000" dirty="0">
+                <a:solidFill>
+                  <a:schemeClr val="tx1"/>
+                </a:solidFill>
+              </a:rPr>
+              <a:t>Check out pandas documentation for available operations:</a:t>
+            </a:r>
+          </a:p>
+          <a:p>
+            <a:pPr lvl="1"/>
+            <a:r>
+              <a:rPr lang="en-US" sz="1600" dirty="0">
+                <a:solidFill>
+                  <a:schemeClr val="tx1"/>
+                </a:solidFill>
+                <a:hlinkClick r:id="rId2"/>
+              </a:rPr>
+              <a:t>https://pandas.pydata.org/pandas-docs/stable/index.html</a:t>
+            </a:r>
+            <a:r>
+              <a:rPr lang="en-US" sz="1600" dirty="0">
+                <a:solidFill>
+                  <a:schemeClr val="tx1"/>
+                </a:solidFill>
+              </a:rPr>
+              <a:t> </a:t>
+            </a:r>
+          </a:p>
+        </p:txBody>
+      </p:sp>
+      <p:pic>
+        <p:nvPicPr>
+          <p:cNvPr id="5" name="Picture 4" descr="A panda from a tree&#10;&#10;Description automatically generated with medium confidence">
+            <a:extLst>
+              <a:ext uri="{FF2B5EF4-FFF2-40B4-BE49-F238E27FC236}">
+                <a16:creationId xmlns:a16="http://schemas.microsoft.com/office/drawing/2014/main" id="{8635B56F-DC14-4D44-AEFB-4EBC7F9A7CF2}"/>
+              </a:ext>
+            </a:extLst>
+          </p:cNvPr>
+          <p:cNvPicPr>
+            <a:picLocks noChangeAspect="1"/>
+          </p:cNvPicPr>
+          <p:nvPr/>
+        </p:nvPicPr>
+        <p:blipFill>
+          <a:blip r:embed="rId3">
+            <a:extLst>
+              <a:ext uri="{28A0092B-C50C-407E-A947-70E740481C1C}">
+                <a14:useLocalDpi xmlns:a14="http://schemas.microsoft.com/office/drawing/2010/main" val="0"/>
+              </a:ext>
+            </a:extLst>
+          </a:blip>
+          <a:stretch>
+            <a:fillRect/>
+          </a:stretch>
+        </p:blipFill>
+        <p:spPr>
+          <a:xfrm>
+            <a:off x="1146031" y="1287606"/>
+            <a:ext cx="4402118" cy="4619914"/>
+          </a:xfrm>
+          <a:prstGeom prst="rect">
+            <a:avLst/>
+          </a:prstGeom>
+        </p:spPr>
+      </p:pic>
+      <p:sp>
+        <p:nvSpPr>
+          <p:cNvPr id="8" name="Content Placeholder 7">
+            <a:extLst>
+              <a:ext uri="{FF2B5EF4-FFF2-40B4-BE49-F238E27FC236}">
+                <a16:creationId xmlns:a16="http://schemas.microsoft.com/office/drawing/2014/main" id="{9548919F-BFAE-495B-9CFF-CC75BB07D6BC}"/>
+              </a:ext>
+            </a:extLst>
+          </p:cNvPr>
+          <p:cNvSpPr>
+            <a:spLocks noGrp="1"/>
+          </p:cNvSpPr>
+          <p:nvPr>
+            <p:ph idx="10"/>
+          </p:nvPr>
+        </p:nvSpPr>
+        <p:spPr/>
+        <p:txBody>
+          <a:bodyPr/>
+          <a:lstStyle/>
+          <a:p>
+            <a:endParaRPr lang="en-GB"/>
+          </a:p>
+        </p:txBody>
+      </p:sp>
+    </p:spTree>
+    <p:extLst>
+      <p:ext uri="{BB962C8B-B14F-4D97-AF65-F5344CB8AC3E}">
+        <p14:creationId xmlns:p14="http://schemas.microsoft.com/office/powerpoint/2010/main" val="381708959"/>
       </p:ext>
     </p:extLst>
   </p:cSld>
@@ -6500,6 +7281,497 @@
 <file path=ppt/slides/slide6.xml><?xml version="1.0" encoding="utf-8"?>
 <p:sld xmlns:a="http://schemas.openxmlformats.org/drawingml/2006/main" xmlns:r="http://schemas.openxmlformats.org/officeDocument/2006/relationships" xmlns:p="http://schemas.openxmlformats.org/presentationml/2006/main">
   <p:cSld>
+    <p:bg>
+      <p:bgPr>
+        <a:solidFill>
+          <a:schemeClr val="bg1"/>
+        </a:solidFill>
+        <a:effectLst/>
+      </p:bgPr>
+    </p:bg>
+    <p:spTree>
+      <p:nvGrpSpPr>
+        <p:cNvPr id="1" name=""/>
+        <p:cNvGrpSpPr/>
+        <p:nvPr/>
+      </p:nvGrpSpPr>
+      <p:grpSpPr>
+        <a:xfrm>
+          <a:off x="0" y="0"/>
+          <a:ext cx="0" cy="0"/>
+          <a:chOff x="0" y="0"/>
+          <a:chExt cx="0" cy="0"/>
+        </a:xfrm>
+      </p:grpSpPr>
+      <p:sp useBgFill="1">
+        <p:nvSpPr>
+          <p:cNvPr id="15" name="Rectangle 14">
+            <a:extLst>
+              <a:ext uri="{FF2B5EF4-FFF2-40B4-BE49-F238E27FC236}">
+                <a16:creationId xmlns:a16="http://schemas.microsoft.com/office/drawing/2014/main" id="{04812C46-200A-4DEB-A05E-3ED6C68C2387}"/>
+              </a:ext>
+              <a:ext uri="{C183D7F6-B498-43B3-948B-1728B52AA6E4}">
+                <adec:decorative xmlns:adec="http://schemas.microsoft.com/office/drawing/2017/decorative" val="1"/>
+              </a:ext>
+            </a:extLst>
+          </p:cNvPr>
+          <p:cNvSpPr>
+            <a:spLocks noGrp="1" noRot="1" noChangeAspect="1" noMove="1" noResize="1" noEditPoints="1" noAdjustHandles="1" noChangeArrowheads="1" noChangeShapeType="1" noTextEdit="1"/>
+          </p:cNvSpPr>
+          <p:nvPr>
+            <p:extLst>
+              <p:ext uri="{386F3935-93C4-4BCD-93E2-E3B085C9AB24}">
+                <p16:designElem xmlns:p16="http://schemas.microsoft.com/office/powerpoint/2015/main" val="1"/>
+              </p:ext>
+            </p:extLst>
+          </p:nvPr>
+        </p:nvSpPr>
+        <p:spPr>
+          <a:xfrm>
+            <a:off x="3049" y="0"/>
+            <a:ext cx="12188952" cy="6858000"/>
+          </a:xfrm>
+          <a:prstGeom prst="rect">
+            <a:avLst/>
+          </a:prstGeom>
+          <a:ln>
+            <a:noFill/>
+          </a:ln>
+        </p:spPr>
+        <p:style>
+          <a:lnRef idx="2">
+            <a:schemeClr val="accent1">
+              <a:shade val="50000"/>
+            </a:schemeClr>
+          </a:lnRef>
+          <a:fillRef idx="1">
+            <a:schemeClr val="accent1"/>
+          </a:fillRef>
+          <a:effectRef idx="0">
+            <a:schemeClr val="accent1"/>
+          </a:effectRef>
+          <a:fontRef idx="minor">
+            <a:schemeClr val="lt1"/>
+          </a:fontRef>
+        </p:style>
+        <p:txBody>
+          <a:bodyPr rtlCol="0" anchor="ctr"/>
+          <a:lstStyle/>
+          <a:p>
+            <a:pPr algn="ctr"/>
+            <a:endParaRPr lang="en-US"/>
+          </a:p>
+        </p:txBody>
+      </p:sp>
+      <p:pic>
+        <p:nvPicPr>
+          <p:cNvPr id="10" name="Content Placeholder 9" descr="A picture containing mammal, panda, outdoor, plant&#10;&#10;Description automatically generated">
+            <a:extLst>
+              <a:ext uri="{FF2B5EF4-FFF2-40B4-BE49-F238E27FC236}">
+                <a16:creationId xmlns:a16="http://schemas.microsoft.com/office/drawing/2014/main" id="{A429B0D6-8E84-4749-9CDE-F28D04791E77}"/>
+              </a:ext>
+            </a:extLst>
+          </p:cNvPr>
+          <p:cNvPicPr>
+            <a:picLocks noGrp="1" noChangeAspect="1"/>
+          </p:cNvPicPr>
+          <p:nvPr>
+            <p:ph idx="10"/>
+          </p:nvPr>
+        </p:nvPicPr>
+        <p:blipFill rotWithShape="1">
+          <a:blip r:embed="rId2">
+            <a:extLst>
+              <a:ext uri="{28A0092B-C50C-407E-A947-70E740481C1C}">
+                <a14:useLocalDpi xmlns:a14="http://schemas.microsoft.com/office/drawing/2010/main" val="0"/>
+              </a:ext>
+            </a:extLst>
+          </a:blip>
+          <a:srcRect l="2078" r="3805" b="-1"/>
+          <a:stretch/>
+        </p:blipFill>
+        <p:spPr>
+          <a:xfrm>
+            <a:off x="2522356" y="10"/>
+            <a:ext cx="9669642" cy="6857990"/>
+          </a:xfrm>
+          <a:prstGeom prst="rect">
+            <a:avLst/>
+          </a:prstGeom>
+        </p:spPr>
+      </p:pic>
+      <p:sp>
+        <p:nvSpPr>
+          <p:cNvPr id="17" name="Rectangle 16">
+            <a:extLst>
+              <a:ext uri="{FF2B5EF4-FFF2-40B4-BE49-F238E27FC236}">
+                <a16:creationId xmlns:a16="http://schemas.microsoft.com/office/drawing/2014/main" id="{D1EA859B-E555-4109-94F3-6700E046E008}"/>
+              </a:ext>
+              <a:ext uri="{C183D7F6-B498-43B3-948B-1728B52AA6E4}">
+                <adec:decorative xmlns:adec="http://schemas.microsoft.com/office/drawing/2017/decorative" val="1"/>
+              </a:ext>
+            </a:extLst>
+          </p:cNvPr>
+          <p:cNvSpPr>
+            <a:spLocks noGrp="1" noRot="1" noChangeAspect="1" noMove="1" noResize="1" noEditPoints="1" noAdjustHandles="1" noChangeArrowheads="1" noChangeShapeType="1" noTextEdit="1"/>
+          </p:cNvSpPr>
+          <p:nvPr>
+            <p:extLst>
+              <p:ext uri="{386F3935-93C4-4BCD-93E2-E3B085C9AB24}">
+                <p16:designElem xmlns:p16="http://schemas.microsoft.com/office/powerpoint/2015/main" val="1"/>
+              </p:ext>
+            </p:extLst>
+          </p:nvPr>
+        </p:nvSpPr>
+        <p:spPr>
+          <a:xfrm>
+            <a:off x="-1" y="0"/>
+            <a:ext cx="7390263" cy="6858000"/>
+          </a:xfrm>
+          <a:prstGeom prst="rect">
+            <a:avLst/>
+          </a:prstGeom>
+          <a:gradFill>
+            <a:gsLst>
+              <a:gs pos="48000">
+                <a:schemeClr val="bg1"/>
+              </a:gs>
+              <a:gs pos="35000">
+                <a:schemeClr val="bg1">
+                  <a:alpha val="77000"/>
+                </a:schemeClr>
+              </a:gs>
+              <a:gs pos="19000">
+                <a:schemeClr val="bg1">
+                  <a:alpha val="38000"/>
+                </a:schemeClr>
+              </a:gs>
+              <a:gs pos="0">
+                <a:schemeClr val="bg1">
+                  <a:alpha val="0"/>
+                </a:schemeClr>
+              </a:gs>
+              <a:gs pos="100000">
+                <a:schemeClr val="bg1"/>
+              </a:gs>
+            </a:gsLst>
+            <a:lin ang="10800000" scaled="0"/>
+          </a:gradFill>
+          <a:ln>
+            <a:noFill/>
+          </a:ln>
+        </p:spPr>
+        <p:style>
+          <a:lnRef idx="2">
+            <a:schemeClr val="accent1">
+              <a:shade val="50000"/>
+            </a:schemeClr>
+          </a:lnRef>
+          <a:fillRef idx="1">
+            <a:schemeClr val="accent1"/>
+          </a:fillRef>
+          <a:effectRef idx="0">
+            <a:schemeClr val="accent1"/>
+          </a:effectRef>
+          <a:fontRef idx="minor">
+            <a:schemeClr val="lt1"/>
+          </a:fontRef>
+        </p:style>
+        <p:txBody>
+          <a:bodyPr rtlCol="0" anchor="ctr"/>
+          <a:lstStyle/>
+          <a:p>
+            <a:pPr algn="ctr"/>
+            <a:endParaRPr lang="en-US" dirty="0"/>
+          </a:p>
+        </p:txBody>
+      </p:sp>
+      <p:sp>
+        <p:nvSpPr>
+          <p:cNvPr id="4" name="Content Placeholder 3">
+            <a:extLst>
+              <a:ext uri="{FF2B5EF4-FFF2-40B4-BE49-F238E27FC236}">
+                <a16:creationId xmlns:a16="http://schemas.microsoft.com/office/drawing/2014/main" id="{D1D163E7-19A7-48AF-B25F-DD5C2105C849}"/>
+              </a:ext>
+            </a:extLst>
+          </p:cNvPr>
+          <p:cNvSpPr>
+            <a:spLocks noGrp="1"/>
+          </p:cNvSpPr>
+          <p:nvPr>
+            <p:ph idx="1"/>
+          </p:nvPr>
+        </p:nvSpPr>
+        <p:spPr>
+          <a:xfrm>
+            <a:off x="838200" y="1216015"/>
+            <a:ext cx="3822189" cy="4960948"/>
+          </a:xfrm>
+        </p:spPr>
+        <p:txBody>
+          <a:bodyPr vert="horz" lIns="91440" tIns="45720" rIns="91440" bIns="45720" rtlCol="0">
+            <a:noAutofit/>
+          </a:bodyPr>
+          <a:lstStyle/>
+          <a:p>
+            <a:r>
+              <a:rPr lang="en-US" sz="1800" dirty="0">
+                <a:solidFill>
+                  <a:schemeClr val="tx1"/>
+                </a:solidFill>
+              </a:rPr>
+              <a:t>print(</a:t>
+            </a:r>
+            <a:r>
+              <a:rPr lang="en-US" sz="1800" dirty="0" err="1">
+                <a:solidFill>
+                  <a:schemeClr val="tx1"/>
+                </a:solidFill>
+              </a:rPr>
+              <a:t>DataFrame.shape</a:t>
+            </a:r>
+            <a:r>
+              <a:rPr lang="en-US" sz="1800" dirty="0">
+                <a:solidFill>
+                  <a:schemeClr val="tx1"/>
+                </a:solidFill>
+              </a:rPr>
+              <a:t>)</a:t>
+            </a:r>
+          </a:p>
+          <a:p>
+            <a:pPr lvl="1"/>
+            <a:r>
+              <a:rPr lang="en-US" sz="1800" dirty="0">
+                <a:solidFill>
+                  <a:schemeClr val="tx1"/>
+                </a:solidFill>
+              </a:rPr>
+              <a:t>Check for size (row, col), is it abnormal?</a:t>
+            </a:r>
+          </a:p>
+          <a:p>
+            <a:pPr marL="0"/>
+            <a:endParaRPr lang="en-US" sz="1800" dirty="0">
+              <a:solidFill>
+                <a:schemeClr val="tx1"/>
+              </a:solidFill>
+            </a:endParaRPr>
+          </a:p>
+          <a:p>
+            <a:r>
+              <a:rPr lang="en-US" sz="1800" dirty="0">
+                <a:solidFill>
+                  <a:schemeClr val="tx1"/>
+                </a:solidFill>
+              </a:rPr>
+              <a:t>print(</a:t>
+            </a:r>
+            <a:r>
+              <a:rPr lang="en-US" sz="1800" dirty="0" err="1">
+                <a:solidFill>
+                  <a:schemeClr val="tx1"/>
+                </a:solidFill>
+              </a:rPr>
+              <a:t>DataFrame.describe</a:t>
+            </a:r>
+            <a:r>
+              <a:rPr lang="en-US" sz="1800" dirty="0">
+                <a:solidFill>
+                  <a:schemeClr val="tx1"/>
+                </a:solidFill>
+              </a:rPr>
+              <a:t>())</a:t>
+            </a:r>
+          </a:p>
+          <a:p>
+            <a:pPr lvl="1"/>
+            <a:r>
+              <a:rPr lang="en-US" sz="1800" dirty="0">
+                <a:solidFill>
+                  <a:schemeClr val="tx1"/>
+                </a:solidFill>
+              </a:rPr>
+              <a:t>Quick stats for quantitative columns</a:t>
+            </a:r>
+          </a:p>
+          <a:p>
+            <a:pPr marL="0"/>
+            <a:endParaRPr lang="en-US" sz="1800" dirty="0">
+              <a:solidFill>
+                <a:schemeClr val="tx1"/>
+              </a:solidFill>
+            </a:endParaRPr>
+          </a:p>
+          <a:p>
+            <a:r>
+              <a:rPr lang="en-US" sz="1800" dirty="0">
+                <a:solidFill>
+                  <a:schemeClr val="tx1"/>
+                </a:solidFill>
+              </a:rPr>
+              <a:t>print(DataFrame.info())</a:t>
+            </a:r>
+          </a:p>
+          <a:p>
+            <a:pPr lvl="1"/>
+            <a:r>
+              <a:rPr lang="en-US" sz="1800" dirty="0">
+                <a:solidFill>
+                  <a:schemeClr val="tx1"/>
+                </a:solidFill>
+              </a:rPr>
+              <a:t>Check for data types, are </a:t>
+            </a:r>
+            <a:r>
+              <a:rPr lang="en-US" sz="1800" dirty="0" err="1">
+                <a:solidFill>
+                  <a:schemeClr val="tx1"/>
+                </a:solidFill>
+              </a:rPr>
+              <a:t>FactorId</a:t>
+            </a:r>
+            <a:r>
+              <a:rPr lang="en-US" sz="1800" dirty="0">
+                <a:solidFill>
+                  <a:schemeClr val="tx1"/>
+                </a:solidFill>
+              </a:rPr>
+              <a:t> column an integers? Are URL strings? Are datetime </a:t>
+            </a:r>
+            <a:r>
+              <a:rPr lang="en-US" sz="1800" dirty="0" err="1">
+                <a:solidFill>
+                  <a:schemeClr val="tx1"/>
+                </a:solidFill>
+              </a:rPr>
+              <a:t>datetime</a:t>
+            </a:r>
+            <a:r>
+              <a:rPr lang="en-US" sz="1800" dirty="0">
+                <a:solidFill>
+                  <a:schemeClr val="tx1"/>
+                </a:solidFill>
+              </a:rPr>
+              <a:t>?</a:t>
+            </a:r>
+          </a:p>
+          <a:p>
+            <a:endParaRPr lang="en-US" sz="1800" dirty="0">
+              <a:solidFill>
+                <a:schemeClr val="tx1"/>
+              </a:solidFill>
+            </a:endParaRPr>
+          </a:p>
+          <a:p>
+            <a:r>
+              <a:rPr lang="en-US" sz="1800" dirty="0">
+                <a:solidFill>
+                  <a:schemeClr val="tx1"/>
+                </a:solidFill>
+              </a:rPr>
+              <a:t>Print(</a:t>
+            </a:r>
+            <a:r>
+              <a:rPr lang="en-US" sz="1800" dirty="0" err="1">
+                <a:solidFill>
+                  <a:schemeClr val="tx1"/>
+                </a:solidFill>
+              </a:rPr>
+              <a:t>DataFrame.sample</a:t>
+            </a:r>
+            <a:r>
+              <a:rPr lang="en-US" sz="1800" dirty="0">
+                <a:solidFill>
+                  <a:schemeClr val="tx1"/>
+                </a:solidFill>
+              </a:rPr>
+              <a:t>(n = x))</a:t>
+            </a:r>
+          </a:p>
+          <a:p>
+            <a:pPr lvl="1"/>
+            <a:r>
+              <a:rPr lang="en-US" sz="1800" dirty="0">
+                <a:solidFill>
+                  <a:schemeClr val="tx1"/>
+                </a:solidFill>
+              </a:rPr>
+              <a:t>Randomly sample the data!</a:t>
+            </a:r>
+          </a:p>
+        </p:txBody>
+      </p:sp>
+      <p:sp>
+        <p:nvSpPr>
+          <p:cNvPr id="14" name="Title 4">
+            <a:extLst>
+              <a:ext uri="{FF2B5EF4-FFF2-40B4-BE49-F238E27FC236}">
+                <a16:creationId xmlns:a16="http://schemas.microsoft.com/office/drawing/2014/main" id="{F2260709-6656-444D-A51A-18329F803008}"/>
+              </a:ext>
+            </a:extLst>
+          </p:cNvPr>
+          <p:cNvSpPr txBox="1">
+            <a:spLocks/>
+          </p:cNvSpPr>
+          <p:nvPr/>
+        </p:nvSpPr>
+        <p:spPr>
+          <a:xfrm>
+            <a:off x="0" y="365125"/>
+            <a:ext cx="12188000" cy="485775"/>
+          </a:xfrm>
+          <a:prstGeom prst="rect">
+            <a:avLst/>
+          </a:prstGeom>
+        </p:spPr>
+        <p:txBody>
+          <a:bodyPr vert="horz" lIns="91440" tIns="45720" rIns="91440" bIns="45720" rtlCol="0" anchor="ctr">
+            <a:normAutofit/>
+          </a:bodyPr>
+          <a:lstStyle>
+            <a:lvl1pPr algn="ctr" defTabSz="914400" rtl="0" eaLnBrk="1" latinLnBrk="0" hangingPunct="1">
+              <a:lnSpc>
+                <a:spcPct val="90000"/>
+              </a:lnSpc>
+              <a:spcBef>
+                <a:spcPct val="0"/>
+              </a:spcBef>
+              <a:buNone/>
+              <a:defRPr sz="2800" kern="1200" spc="200" baseline="0">
+                <a:solidFill>
+                  <a:srgbClr val="6CFFFA"/>
+                </a:solidFill>
+                <a:latin typeface="+mn-lt"/>
+                <a:ea typeface="+mj-ea"/>
+                <a:cs typeface="+mj-cs"/>
+              </a:defRPr>
+            </a:lvl1pPr>
+          </a:lstStyle>
+          <a:p>
+            <a:r>
+              <a:rPr lang="en-US" dirty="0"/>
+              <a:t>ALWAYS INSPECT THE DATA!</a:t>
+            </a:r>
+          </a:p>
+        </p:txBody>
+      </p:sp>
+    </p:spTree>
+    <p:extLst>
+      <p:ext uri="{BB962C8B-B14F-4D97-AF65-F5344CB8AC3E}">
+        <p14:creationId xmlns:p14="http://schemas.microsoft.com/office/powerpoint/2010/main" val="2869948420"/>
+      </p:ext>
+    </p:extLst>
+  </p:cSld>
+  <p:clrMapOvr>
+    <a:masterClrMapping/>
+  </p:clrMapOvr>
+</p:sld>
+</file>
+
+<file path=ppt/slides/slide7.xml><?xml version="1.0" encoding="utf-8"?>
+<p:sld xmlns:a="http://schemas.openxmlformats.org/drawingml/2006/main" xmlns:r="http://schemas.openxmlformats.org/officeDocument/2006/relationships" xmlns:p="http://schemas.openxmlformats.org/presentationml/2006/main">
+  <p:cSld>
     <p:spTree>
       <p:nvGrpSpPr>
         <p:cNvPr id="1" name=""/>
@@ -7180,6 +8452,507 @@
     <p:extLst>
       <p:ext uri="{BB962C8B-B14F-4D97-AF65-F5344CB8AC3E}">
         <p14:creationId xmlns:p14="http://schemas.microsoft.com/office/powerpoint/2010/main" val="3870358594"/>
+      </p:ext>
+    </p:extLst>
+  </p:cSld>
+  <p:clrMapOvr>
+    <a:masterClrMapping/>
+  </p:clrMapOvr>
+</p:sld>
+</file>
+
+<file path=ppt/slides/slide8.xml><?xml version="1.0" encoding="utf-8"?>
+<p:sld xmlns:a="http://schemas.openxmlformats.org/drawingml/2006/main" xmlns:r="http://schemas.openxmlformats.org/officeDocument/2006/relationships" xmlns:p="http://schemas.openxmlformats.org/presentationml/2006/main">
+  <p:cSld>
+    <p:spTree>
+      <p:nvGrpSpPr>
+        <p:cNvPr id="1" name=""/>
+        <p:cNvGrpSpPr/>
+        <p:nvPr/>
+      </p:nvGrpSpPr>
+      <p:grpSpPr>
+        <a:xfrm>
+          <a:off x="0" y="0"/>
+          <a:ext cx="0" cy="0"/>
+          <a:chOff x="0" y="0"/>
+          <a:chExt cx="0" cy="0"/>
+        </a:xfrm>
+      </p:grpSpPr>
+      <p:sp>
+        <p:nvSpPr>
+          <p:cNvPr id="2" name="Title 1">
+            <a:extLst>
+              <a:ext uri="{FF2B5EF4-FFF2-40B4-BE49-F238E27FC236}">
+                <a16:creationId xmlns:a16="http://schemas.microsoft.com/office/drawing/2014/main" id="{D4D57C10-3395-E944-AC5D-466668F8A049}"/>
+              </a:ext>
+            </a:extLst>
+          </p:cNvPr>
+          <p:cNvSpPr>
+            <a:spLocks noGrp="1"/>
+          </p:cNvSpPr>
+          <p:nvPr>
+            <p:ph type="title"/>
+          </p:nvPr>
+        </p:nvSpPr>
+        <p:spPr/>
+        <p:txBody>
+          <a:bodyPr>
+            <a:normAutofit fontScale="90000"/>
+          </a:bodyPr>
+          <a:lstStyle/>
+          <a:p>
+            <a:r>
+              <a:rPr lang="en-US" dirty="0"/>
+              <a:t>We can also stack logical queries</a:t>
+            </a:r>
+          </a:p>
+        </p:txBody>
+      </p:sp>
+      <p:sp>
+        <p:nvSpPr>
+          <p:cNvPr id="3" name="Content Placeholder 2">
+            <a:extLst>
+              <a:ext uri="{FF2B5EF4-FFF2-40B4-BE49-F238E27FC236}">
+                <a16:creationId xmlns:a16="http://schemas.microsoft.com/office/drawing/2014/main" id="{9710D64A-7D47-3F45-8BC8-069C5288702D}"/>
+              </a:ext>
+            </a:extLst>
+          </p:cNvPr>
+          <p:cNvSpPr>
+            <a:spLocks noGrp="1"/>
+          </p:cNvSpPr>
+          <p:nvPr>
+            <p:ph idx="1"/>
+          </p:nvPr>
+        </p:nvSpPr>
+        <p:spPr>
+          <a:xfrm>
+            <a:off x="6096000" y="1704831"/>
+            <a:ext cx="5099518" cy="4351338"/>
+          </a:xfrm>
+        </p:spPr>
+        <p:txBody>
+          <a:bodyPr/>
+          <a:lstStyle/>
+          <a:p>
+            <a:r>
+              <a:rPr lang="en-US" sz="1400" dirty="0">
+                <a:solidFill>
+                  <a:schemeClr val="tx1"/>
+                </a:solidFill>
+              </a:rPr>
+              <a:t>What if I just want the Question, </a:t>
+            </a:r>
+            <a:r>
+              <a:rPr lang="en-US" sz="1400" dirty="0" err="1">
+                <a:solidFill>
+                  <a:schemeClr val="tx1"/>
+                </a:solidFill>
+              </a:rPr>
+              <a:t>AgentName</a:t>
+            </a:r>
+            <a:r>
+              <a:rPr lang="en-US" sz="1400" dirty="0">
+                <a:solidFill>
+                  <a:schemeClr val="tx1"/>
+                </a:solidFill>
+              </a:rPr>
+              <a:t> and  Excerpt for </a:t>
+            </a:r>
+            <a:r>
+              <a:rPr lang="en-US" sz="1400" dirty="0" err="1">
+                <a:solidFill>
+                  <a:schemeClr val="tx1"/>
+                </a:solidFill>
+              </a:rPr>
+              <a:t>FactorID</a:t>
+            </a:r>
+            <a:r>
+              <a:rPr lang="en-US" sz="1400" dirty="0">
+                <a:solidFill>
+                  <a:schemeClr val="tx1"/>
+                </a:solidFill>
+              </a:rPr>
+              <a:t> (4907)</a:t>
+            </a:r>
+          </a:p>
+          <a:p>
+            <a:pPr marL="0" indent="0">
+              <a:buNone/>
+            </a:pPr>
+            <a:r>
+              <a:rPr lang="en-US" sz="1400" dirty="0">
+                <a:solidFill>
+                  <a:schemeClr val="tx1"/>
+                </a:solidFill>
+              </a:rPr>
+              <a:t> </a:t>
+            </a:r>
+          </a:p>
+          <a:p>
+            <a:r>
+              <a:rPr lang="en-US" sz="1400" dirty="0">
+                <a:solidFill>
+                  <a:schemeClr val="tx1"/>
+                </a:solidFill>
+              </a:rPr>
+              <a:t>What if I just want the Question, Date, and Answer  for </a:t>
+            </a:r>
+            <a:r>
+              <a:rPr lang="en-US" sz="1400" dirty="0" err="1">
+                <a:solidFill>
+                  <a:schemeClr val="tx1"/>
+                </a:solidFill>
+              </a:rPr>
+              <a:t>FactorID</a:t>
+            </a:r>
+            <a:r>
+              <a:rPr lang="en-US" sz="1400" dirty="0">
+                <a:solidFill>
+                  <a:schemeClr val="tx1"/>
+                </a:solidFill>
+              </a:rPr>
+              <a:t> (4990)</a:t>
+            </a:r>
+          </a:p>
+          <a:p>
+            <a:pPr lvl="1"/>
+            <a:endParaRPr lang="en-US" sz="1000" dirty="0">
+              <a:solidFill>
+                <a:schemeClr val="tx1"/>
+              </a:solidFill>
+            </a:endParaRPr>
+          </a:p>
+          <a:p>
+            <a:endParaRPr lang="en-US" sz="1400" dirty="0">
+              <a:solidFill>
+                <a:schemeClr val="tx1"/>
+              </a:solidFill>
+            </a:endParaRPr>
+          </a:p>
+          <a:p>
+            <a:r>
+              <a:rPr lang="en-US" sz="1400" dirty="0">
+                <a:solidFill>
+                  <a:schemeClr val="tx1"/>
+                </a:solidFill>
+              </a:rPr>
+              <a:t>I want Answers that are all null? </a:t>
+            </a:r>
+          </a:p>
+        </p:txBody>
+      </p:sp>
+      <p:pic>
+        <p:nvPicPr>
+          <p:cNvPr id="7" name="Content Placeholder 6" descr="A screenshot of a video game&#10;&#10;Description automatically generated">
+            <a:extLst>
+              <a:ext uri="{FF2B5EF4-FFF2-40B4-BE49-F238E27FC236}">
+                <a16:creationId xmlns:a16="http://schemas.microsoft.com/office/drawing/2014/main" id="{2CC5CDFB-D7F8-4CCE-8F95-238656C2348B}"/>
+              </a:ext>
+            </a:extLst>
+          </p:cNvPr>
+          <p:cNvPicPr>
+            <a:picLocks noGrp="1" noChangeAspect="1"/>
+          </p:cNvPicPr>
+          <p:nvPr>
+            <p:ph idx="10"/>
+          </p:nvPr>
+        </p:nvPicPr>
+        <p:blipFill>
+          <a:blip r:embed="rId2">
+            <a:extLst>
+              <a:ext uri="{28A0092B-C50C-407E-A947-70E740481C1C}">
+                <a14:useLocalDpi xmlns:a14="http://schemas.microsoft.com/office/drawing/2010/main" val="0"/>
+              </a:ext>
+            </a:extLst>
+          </a:blip>
+          <a:stretch>
+            <a:fillRect/>
+          </a:stretch>
+        </p:blipFill>
+        <p:spPr>
+          <a:xfrm>
+            <a:off x="647700" y="2054184"/>
+            <a:ext cx="4888234" cy="2749632"/>
+          </a:xfrm>
+        </p:spPr>
+      </p:pic>
+      <p:pic>
+        <p:nvPicPr>
+          <p:cNvPr id="10" name="Picture 9">
+            <a:extLst>
+              <a:ext uri="{FF2B5EF4-FFF2-40B4-BE49-F238E27FC236}">
+                <a16:creationId xmlns:a16="http://schemas.microsoft.com/office/drawing/2014/main" id="{33F39C35-805C-4CB4-81EF-FA4A7856EEC6}"/>
+              </a:ext>
+            </a:extLst>
+          </p:cNvPr>
+          <p:cNvPicPr>
+            <a:picLocks noChangeAspect="1"/>
+          </p:cNvPicPr>
+          <p:nvPr/>
+        </p:nvPicPr>
+        <p:blipFill>
+          <a:blip r:embed="rId3"/>
+          <a:stretch>
+            <a:fillRect/>
+          </a:stretch>
+        </p:blipFill>
+        <p:spPr>
+          <a:xfrm>
+            <a:off x="6096000" y="3219409"/>
+            <a:ext cx="5554164" cy="209591"/>
+          </a:xfrm>
+          <a:prstGeom prst="rect">
+            <a:avLst/>
+          </a:prstGeom>
+        </p:spPr>
+      </p:pic>
+    </p:spTree>
+    <p:extLst>
+      <p:ext uri="{BB962C8B-B14F-4D97-AF65-F5344CB8AC3E}">
+        <p14:creationId xmlns:p14="http://schemas.microsoft.com/office/powerpoint/2010/main" val="3392085348"/>
+      </p:ext>
+    </p:extLst>
+  </p:cSld>
+  <p:clrMapOvr>
+    <a:masterClrMapping/>
+  </p:clrMapOvr>
+</p:sld>
+</file>
+
+<file path=ppt/slides/slide9.xml><?xml version="1.0" encoding="utf-8"?>
+<p:sld xmlns:a="http://schemas.openxmlformats.org/drawingml/2006/main" xmlns:r="http://schemas.openxmlformats.org/officeDocument/2006/relationships" xmlns:p="http://schemas.openxmlformats.org/presentationml/2006/main">
+  <p:cSld>
+    <p:spTree>
+      <p:nvGrpSpPr>
+        <p:cNvPr id="1" name=""/>
+        <p:cNvGrpSpPr/>
+        <p:nvPr/>
+      </p:nvGrpSpPr>
+      <p:grpSpPr>
+        <a:xfrm>
+          <a:off x="0" y="0"/>
+          <a:ext cx="0" cy="0"/>
+          <a:chOff x="0" y="0"/>
+          <a:chExt cx="0" cy="0"/>
+        </a:xfrm>
+      </p:grpSpPr>
+      <p:sp>
+        <p:nvSpPr>
+          <p:cNvPr id="2" name="Title 1">
+            <a:extLst>
+              <a:ext uri="{FF2B5EF4-FFF2-40B4-BE49-F238E27FC236}">
+                <a16:creationId xmlns:a16="http://schemas.microsoft.com/office/drawing/2014/main" id="{D4D57C10-3395-E944-AC5D-466668F8A049}"/>
+              </a:ext>
+            </a:extLst>
+          </p:cNvPr>
+          <p:cNvSpPr>
+            <a:spLocks noGrp="1"/>
+          </p:cNvSpPr>
+          <p:nvPr>
+            <p:ph type="title"/>
+          </p:nvPr>
+        </p:nvSpPr>
+        <p:spPr/>
+        <p:txBody>
+          <a:bodyPr>
+            <a:normAutofit fontScale="90000"/>
+          </a:bodyPr>
+          <a:lstStyle/>
+          <a:p>
+            <a:r>
+              <a:rPr lang="en-US" dirty="0"/>
+              <a:t>Let’s look at a specific company?</a:t>
+            </a:r>
+          </a:p>
+        </p:txBody>
+      </p:sp>
+      <p:sp>
+        <p:nvSpPr>
+          <p:cNvPr id="3" name="Content Placeholder 2">
+            <a:extLst>
+              <a:ext uri="{FF2B5EF4-FFF2-40B4-BE49-F238E27FC236}">
+                <a16:creationId xmlns:a16="http://schemas.microsoft.com/office/drawing/2014/main" id="{9710D64A-7D47-3F45-8BC8-069C5288702D}"/>
+              </a:ext>
+            </a:extLst>
+          </p:cNvPr>
+          <p:cNvSpPr>
+            <a:spLocks noGrp="1"/>
+          </p:cNvSpPr>
+          <p:nvPr>
+            <p:ph idx="1"/>
+          </p:nvPr>
+        </p:nvSpPr>
+        <p:spPr>
+          <a:xfrm>
+            <a:off x="844082" y="1704831"/>
+            <a:ext cx="5099518" cy="4351338"/>
+          </a:xfrm>
+        </p:spPr>
+        <p:txBody>
+          <a:bodyPr/>
+          <a:lstStyle/>
+          <a:p>
+            <a:r>
+              <a:rPr lang="en-US" sz="2000" dirty="0">
+                <a:solidFill>
+                  <a:schemeClr val="tx1"/>
+                </a:solidFill>
+              </a:rPr>
+              <a:t>Mercedes-Benz (</a:t>
+            </a:r>
+            <a:r>
+              <a:rPr lang="en-US" sz="2000" dirty="0" err="1">
+                <a:solidFill>
+                  <a:schemeClr val="tx1"/>
+                </a:solidFill>
+              </a:rPr>
+              <a:t>AgentId</a:t>
+            </a:r>
+            <a:r>
+              <a:rPr lang="en-US" sz="2000" dirty="0">
+                <a:solidFill>
+                  <a:schemeClr val="tx1"/>
+                </a:solidFill>
+              </a:rPr>
+              <a:t> == 540)</a:t>
+            </a:r>
+          </a:p>
+          <a:p>
+            <a:pPr lvl="1"/>
+            <a:r>
+              <a:rPr lang="en-US" sz="1600" dirty="0" err="1">
+                <a:solidFill>
+                  <a:schemeClr val="tx1"/>
+                </a:solidFill>
+              </a:rPr>
+              <a:t>Mercedes_df</a:t>
+            </a:r>
+            <a:r>
+              <a:rPr lang="en-US" sz="1600" dirty="0">
+                <a:solidFill>
+                  <a:schemeClr val="tx1"/>
+                </a:solidFill>
+              </a:rPr>
+              <a:t> = </a:t>
+            </a:r>
+            <a:r>
+              <a:rPr lang="en-US" sz="1600" dirty="0" err="1">
+                <a:solidFill>
+                  <a:schemeClr val="tx1"/>
+                </a:solidFill>
+              </a:rPr>
+              <a:t>ESData</a:t>
+            </a:r>
+            <a:r>
+              <a:rPr lang="en-US" sz="1600" dirty="0">
+                <a:solidFill>
+                  <a:schemeClr val="tx1"/>
+                </a:solidFill>
+              </a:rPr>
+              <a:t>[</a:t>
+            </a:r>
+            <a:r>
+              <a:rPr lang="en-US" sz="1600" dirty="0" err="1">
+                <a:solidFill>
+                  <a:schemeClr val="tx1"/>
+                </a:solidFill>
+              </a:rPr>
+              <a:t>ESData</a:t>
+            </a:r>
+            <a:r>
+              <a:rPr lang="en-US" sz="1600" dirty="0">
+                <a:solidFill>
+                  <a:schemeClr val="tx1"/>
+                </a:solidFill>
+              </a:rPr>
+              <a:t>[“</a:t>
+            </a:r>
+            <a:r>
+              <a:rPr lang="en-US" sz="1600" dirty="0" err="1">
+                <a:solidFill>
+                  <a:schemeClr val="tx1"/>
+                </a:solidFill>
+              </a:rPr>
+              <a:t>AgentId</a:t>
+            </a:r>
+            <a:r>
+              <a:rPr lang="en-US" sz="1600" dirty="0">
+                <a:solidFill>
+                  <a:schemeClr val="tx1"/>
+                </a:solidFill>
+              </a:rPr>
+              <a:t>”] == 540]</a:t>
+            </a:r>
+          </a:p>
+          <a:p>
+            <a:pPr lvl="1"/>
+            <a:endParaRPr lang="en-US" sz="1000" dirty="0">
+              <a:solidFill>
+                <a:schemeClr val="tx1"/>
+              </a:solidFill>
+            </a:endParaRPr>
+          </a:p>
+        </p:txBody>
+      </p:sp>
+      <p:sp>
+        <p:nvSpPr>
+          <p:cNvPr id="5" name="Content Placeholder 4">
+            <a:extLst>
+              <a:ext uri="{FF2B5EF4-FFF2-40B4-BE49-F238E27FC236}">
+                <a16:creationId xmlns:a16="http://schemas.microsoft.com/office/drawing/2014/main" id="{4F3E9031-90B9-4EBE-8E2A-D2A2C2BCA763}"/>
+              </a:ext>
+            </a:extLst>
+          </p:cNvPr>
+          <p:cNvSpPr>
+            <a:spLocks noGrp="1"/>
+          </p:cNvSpPr>
+          <p:nvPr>
+            <p:ph idx="10"/>
+          </p:nvPr>
+        </p:nvSpPr>
+        <p:spPr/>
+        <p:txBody>
+          <a:bodyPr/>
+          <a:lstStyle/>
+          <a:p>
+            <a:endParaRPr lang="en-GB"/>
+          </a:p>
+        </p:txBody>
+      </p:sp>
+      <p:pic>
+        <p:nvPicPr>
+          <p:cNvPr id="7" name="Picture 6">
+            <a:extLst>
+              <a:ext uri="{FF2B5EF4-FFF2-40B4-BE49-F238E27FC236}">
+                <a16:creationId xmlns:a16="http://schemas.microsoft.com/office/drawing/2014/main" id="{5FCA0E10-DE5A-4AC2-8023-E987A5ADB422}"/>
+              </a:ext>
+            </a:extLst>
+          </p:cNvPr>
+          <p:cNvPicPr>
+            <a:picLocks noChangeAspect="1"/>
+          </p:cNvPicPr>
+          <p:nvPr/>
+        </p:nvPicPr>
+        <p:blipFill>
+          <a:blip r:embed="rId2"/>
+          <a:stretch>
+            <a:fillRect/>
+          </a:stretch>
+        </p:blipFill>
+        <p:spPr>
+          <a:xfrm>
+            <a:off x="2597141" y="2917371"/>
+            <a:ext cx="8750777" cy="3138798"/>
+          </a:xfrm>
+          <a:prstGeom prst="rect">
+            <a:avLst/>
+          </a:prstGeom>
+        </p:spPr>
+      </p:pic>
+    </p:spTree>
+    <p:extLst>
+      <p:ext uri="{BB962C8B-B14F-4D97-AF65-F5344CB8AC3E}">
+        <p14:creationId xmlns:p14="http://schemas.microsoft.com/office/powerpoint/2010/main" val="3892243842"/>
       </p:ext>
     </p:extLst>
   </p:cSld>

</xml_diff>

<commit_message>
feat(v0.0.2): Data Viz using TCFD construction industry
Prepared datasets for TCFD factors for construction GICS, first donut chart plotted, will do facet plot next
</commit_message>
<xml_diff>
--- a/references/03_DataFrame.pptx
+++ b/references/03_DataFrame.pptx
@@ -209,7 +209,7 @@
           <a:p>
             <a:fld id="{299CAFE8-42F5-4056-865F-8BF4CB53BBFA}" type="datetimeFigureOut">
               <a:rPr lang="en-GB" smtClean="0"/>
-              <a:t>15/06/2023</a:t>
+              <a:t>16/06/2023</a:t>
             </a:fld>
             <a:endParaRPr lang="en-GB"/>
           </a:p>
@@ -914,7 +914,7 @@
           <a:p>
             <a:fld id="{D3E068FC-FE45-45C4-9E03-B2F436A483E6}" type="datetimeFigureOut">
               <a:rPr lang="en-GB" smtClean="0"/>
-              <a:t>15/06/2023</a:t>
+              <a:t>16/06/2023</a:t>
             </a:fld>
             <a:endParaRPr lang="en-GB"/>
           </a:p>
@@ -1084,7 +1084,7 @@
           <a:p>
             <a:fld id="{D3E068FC-FE45-45C4-9E03-B2F436A483E6}" type="datetimeFigureOut">
               <a:rPr lang="en-GB" smtClean="0"/>
-              <a:t>15/06/2023</a:t>
+              <a:t>16/06/2023</a:t>
             </a:fld>
             <a:endParaRPr lang="en-GB"/>
           </a:p>
@@ -1264,7 +1264,7 @@
           <a:p>
             <a:fld id="{D3E068FC-FE45-45C4-9E03-B2F436A483E6}" type="datetimeFigureOut">
               <a:rPr lang="en-GB" smtClean="0"/>
-              <a:t>15/06/2023</a:t>
+              <a:t>16/06/2023</a:t>
             </a:fld>
             <a:endParaRPr lang="en-GB"/>
           </a:p>
@@ -2763,7 +2763,7 @@
           <a:p>
             <a:fld id="{D3E068FC-FE45-45C4-9E03-B2F436A483E6}" type="datetimeFigureOut">
               <a:rPr lang="en-GB" smtClean="0"/>
-              <a:t>15/06/2023</a:t>
+              <a:t>16/06/2023</a:t>
             </a:fld>
             <a:endParaRPr lang="en-GB"/>
           </a:p>
@@ -3009,7 +3009,7 @@
           <a:p>
             <a:fld id="{D3E068FC-FE45-45C4-9E03-B2F436A483E6}" type="datetimeFigureOut">
               <a:rPr lang="en-GB" smtClean="0"/>
-              <a:t>15/06/2023</a:t>
+              <a:t>16/06/2023</a:t>
             </a:fld>
             <a:endParaRPr lang="en-GB"/>
           </a:p>
@@ -3241,7 +3241,7 @@
           <a:p>
             <a:fld id="{D3E068FC-FE45-45C4-9E03-B2F436A483E6}" type="datetimeFigureOut">
               <a:rPr lang="en-GB" smtClean="0"/>
-              <a:t>15/06/2023</a:t>
+              <a:t>16/06/2023</a:t>
             </a:fld>
             <a:endParaRPr lang="en-GB"/>
           </a:p>
@@ -3608,7 +3608,7 @@
           <a:p>
             <a:fld id="{D3E068FC-FE45-45C4-9E03-B2F436A483E6}" type="datetimeFigureOut">
               <a:rPr lang="en-GB" smtClean="0"/>
-              <a:t>15/06/2023</a:t>
+              <a:t>16/06/2023</a:t>
             </a:fld>
             <a:endParaRPr lang="en-GB"/>
           </a:p>
@@ -3726,7 +3726,7 @@
           <a:p>
             <a:fld id="{D3E068FC-FE45-45C4-9E03-B2F436A483E6}" type="datetimeFigureOut">
               <a:rPr lang="en-GB" smtClean="0"/>
-              <a:t>15/06/2023</a:t>
+              <a:t>16/06/2023</a:t>
             </a:fld>
             <a:endParaRPr lang="en-GB"/>
           </a:p>
@@ -3821,7 +3821,7 @@
           <a:p>
             <a:fld id="{D3E068FC-FE45-45C4-9E03-B2F436A483E6}" type="datetimeFigureOut">
               <a:rPr lang="en-GB" smtClean="0"/>
-              <a:t>15/06/2023</a:t>
+              <a:t>16/06/2023</a:t>
             </a:fld>
             <a:endParaRPr lang="en-GB"/>
           </a:p>
@@ -4098,7 +4098,7 @@
           <a:p>
             <a:fld id="{D3E068FC-FE45-45C4-9E03-B2F436A483E6}" type="datetimeFigureOut">
               <a:rPr lang="en-GB" smtClean="0"/>
-              <a:t>15/06/2023</a:t>
+              <a:t>16/06/2023</a:t>
             </a:fld>
             <a:endParaRPr lang="en-GB"/>
           </a:p>
@@ -4355,7 +4355,7 @@
           <a:p>
             <a:fld id="{D3E068FC-FE45-45C4-9E03-B2F436A483E6}" type="datetimeFigureOut">
               <a:rPr lang="en-GB" smtClean="0"/>
-              <a:t>15/06/2023</a:t>
+              <a:t>16/06/2023</a:t>
             </a:fld>
             <a:endParaRPr lang="en-GB"/>
           </a:p>
@@ -4568,7 +4568,7 @@
           <a:p>
             <a:fld id="{D3E068FC-FE45-45C4-9E03-B2F436A483E6}" type="datetimeFigureOut">
               <a:rPr lang="en-GB" smtClean="0"/>
-              <a:t>15/06/2023</a:t>
+              <a:t>16/06/2023</a:t>
             </a:fld>
             <a:endParaRPr lang="en-GB"/>
           </a:p>

</xml_diff>